<commit_message>
fix(SAP): changed image files
</commit_message>
<xml_diff>
--- a/PPT Materials.pptx
+++ b/PPT Materials.pptx
@@ -5383,7 +5383,7 @@
           <a:p>
             <a:fld id="{6C0AFD19-548D-48E9-941B-FDA55EF07C84}" type="datetimeFigureOut">
               <a:rPr lang="ko-KR" altLang="en-US" smtClean="0"/>
-              <a:t>2020-03-29</a:t>
+              <a:t>2020-04-15</a:t>
             </a:fld>
             <a:endParaRPr lang="ko-KR" altLang="en-US" dirty="0"/>
           </a:p>
@@ -5551,7 +5551,7 @@
           <a:p>
             <a:fld id="{6C0AFD19-548D-48E9-941B-FDA55EF07C84}" type="datetimeFigureOut">
               <a:rPr lang="ko-KR" altLang="en-US" smtClean="0"/>
-              <a:t>2020-03-29</a:t>
+              <a:t>2020-04-15</a:t>
             </a:fld>
             <a:endParaRPr lang="ko-KR" altLang="en-US" dirty="0"/>
           </a:p>
@@ -5729,7 +5729,7 @@
           <a:p>
             <a:fld id="{6C0AFD19-548D-48E9-941B-FDA55EF07C84}" type="datetimeFigureOut">
               <a:rPr lang="ko-KR" altLang="en-US" smtClean="0"/>
-              <a:t>2020-03-29</a:t>
+              <a:t>2020-04-15</a:t>
             </a:fld>
             <a:endParaRPr lang="ko-KR" altLang="en-US" dirty="0"/>
           </a:p>
@@ -5897,7 +5897,7 @@
           <a:p>
             <a:fld id="{6C0AFD19-548D-48E9-941B-FDA55EF07C84}" type="datetimeFigureOut">
               <a:rPr lang="ko-KR" altLang="en-US" smtClean="0"/>
-              <a:t>2020-03-29</a:t>
+              <a:t>2020-04-15</a:t>
             </a:fld>
             <a:endParaRPr lang="ko-KR" altLang="en-US" dirty="0"/>
           </a:p>
@@ -6142,7 +6142,7 @@
           <a:p>
             <a:fld id="{6C0AFD19-548D-48E9-941B-FDA55EF07C84}" type="datetimeFigureOut">
               <a:rPr lang="ko-KR" altLang="en-US" smtClean="0"/>
-              <a:t>2020-03-29</a:t>
+              <a:t>2020-04-15</a:t>
             </a:fld>
             <a:endParaRPr lang="ko-KR" altLang="en-US" dirty="0"/>
           </a:p>
@@ -6371,7 +6371,7 @@
           <a:p>
             <a:fld id="{6C0AFD19-548D-48E9-941B-FDA55EF07C84}" type="datetimeFigureOut">
               <a:rPr lang="ko-KR" altLang="en-US" smtClean="0"/>
-              <a:t>2020-03-29</a:t>
+              <a:t>2020-04-15</a:t>
             </a:fld>
             <a:endParaRPr lang="ko-KR" altLang="en-US" dirty="0"/>
           </a:p>
@@ -6735,7 +6735,7 @@
           <a:p>
             <a:fld id="{6C0AFD19-548D-48E9-941B-FDA55EF07C84}" type="datetimeFigureOut">
               <a:rPr lang="ko-KR" altLang="en-US" smtClean="0"/>
-              <a:t>2020-03-29</a:t>
+              <a:t>2020-04-15</a:t>
             </a:fld>
             <a:endParaRPr lang="ko-KR" altLang="en-US" dirty="0"/>
           </a:p>
@@ -6852,7 +6852,7 @@
           <a:p>
             <a:fld id="{6C0AFD19-548D-48E9-941B-FDA55EF07C84}" type="datetimeFigureOut">
               <a:rPr lang="ko-KR" altLang="en-US" smtClean="0"/>
-              <a:t>2020-03-29</a:t>
+              <a:t>2020-04-15</a:t>
             </a:fld>
             <a:endParaRPr lang="ko-KR" altLang="en-US" dirty="0"/>
           </a:p>
@@ -6947,7 +6947,7 @@
           <a:p>
             <a:fld id="{6C0AFD19-548D-48E9-941B-FDA55EF07C84}" type="datetimeFigureOut">
               <a:rPr lang="ko-KR" altLang="en-US" smtClean="0"/>
-              <a:t>2020-03-29</a:t>
+              <a:t>2020-04-15</a:t>
             </a:fld>
             <a:endParaRPr lang="ko-KR" altLang="en-US" dirty="0"/>
           </a:p>
@@ -7222,7 +7222,7 @@
           <a:p>
             <a:fld id="{6C0AFD19-548D-48E9-941B-FDA55EF07C84}" type="datetimeFigureOut">
               <a:rPr lang="ko-KR" altLang="en-US" smtClean="0"/>
-              <a:t>2020-03-29</a:t>
+              <a:t>2020-04-15</a:t>
             </a:fld>
             <a:endParaRPr lang="ko-KR" altLang="en-US" dirty="0"/>
           </a:p>
@@ -7474,7 +7474,7 @@
           <a:p>
             <a:fld id="{6C0AFD19-548D-48E9-941B-FDA55EF07C84}" type="datetimeFigureOut">
               <a:rPr lang="ko-KR" altLang="en-US" smtClean="0"/>
-              <a:t>2020-03-29</a:t>
+              <a:t>2020-04-15</a:t>
             </a:fld>
             <a:endParaRPr lang="ko-KR" altLang="en-US" dirty="0"/>
           </a:p>
@@ -7685,7 +7685,7 @@
           <a:p>
             <a:fld id="{6C0AFD19-548D-48E9-941B-FDA55EF07C84}" type="datetimeFigureOut">
               <a:rPr lang="ko-KR" altLang="en-US" smtClean="0"/>
-              <a:t>2020-03-29</a:t>
+              <a:t>2020-04-15</a:t>
             </a:fld>
             <a:endParaRPr lang="ko-KR" altLang="en-US" dirty="0"/>
           </a:p>
@@ -13527,8 +13527,8 @@
           </a:p>
         </p:txBody>
       </p:sp>
-      <mc:AlternateContent xmlns:mc="http://schemas.openxmlformats.org/markup-compatibility/2006">
-        <mc:Choice xmlns:a14="http://schemas.microsoft.com/office/drawing/2010/main" Requires="a14">
+      <mc:AlternateContent xmlns:mc="http://schemas.openxmlformats.org/markup-compatibility/2006" xmlns:a14="http://schemas.microsoft.com/office/drawing/2010/main">
+        <mc:Choice Requires="a14">
           <p:sp>
             <p:nvSpPr>
               <p:cNvPr id="38" name="TextBox 37"/>
@@ -14328,7 +14328,7 @@
             </p:txBody>
           </p:sp>
         </mc:Choice>
-        <mc:Fallback>
+        <mc:Fallback xmlns="">
           <p:sp>
             <p:nvSpPr>
               <p:cNvPr id="38" name="TextBox 37"/>
@@ -27078,7 +27078,13 @@
       </p:grpSpPr>
       <p:pic>
         <p:nvPicPr>
-          <p:cNvPr id="5" name="그림 4"/>
+          <p:cNvPr id="7" name="그림 6">
+            <a:extLst>
+              <a:ext uri="{FF2B5EF4-FFF2-40B4-BE49-F238E27FC236}">
+                <a16:creationId xmlns:a16="http://schemas.microsoft.com/office/drawing/2014/main" id="{E83FD2A7-E148-4EC9-9F4B-E536AA678D13}"/>
+              </a:ext>
+            </a:extLst>
+          </p:cNvPr>
           <p:cNvPicPr>
             <a:picLocks noChangeAspect="1"/>
           </p:cNvPicPr>
@@ -27097,9 +27103,9 @@
           </a:stretch>
         </p:blipFill>
         <p:spPr>
-          <a:xfrm>
-            <a:off x="1054175" y="1075147"/>
-            <a:ext cx="7231407" cy="4078513"/>
+          <a:xfrm rot="20899388">
+            <a:off x="2091623" y="1277270"/>
+            <a:ext cx="5342914" cy="3679554"/>
           </a:xfrm>
           <a:prstGeom prst="rect">
             <a:avLst/>
@@ -27230,7 +27236,7 @@
         </p:nvSpPr>
         <p:spPr>
           <a:xfrm>
-            <a:off x="7852506" y="2828751"/>
+            <a:off x="7505370" y="2727150"/>
             <a:ext cx="718459" cy="695130"/>
           </a:xfrm>
           <a:prstGeom prst="ellipse">
@@ -27280,7 +27286,7 @@
         </p:nvCxnSpPr>
         <p:spPr>
           <a:xfrm>
-            <a:off x="7318217" y="3217506"/>
+            <a:off x="6971081" y="3115905"/>
             <a:ext cx="454181" cy="0"/>
           </a:xfrm>
           <a:prstGeom prst="straightConnector1">
@@ -27408,8 +27414,8 @@
           </p:sp>
         </mc:Fallback>
       </mc:AlternateContent>
-      <mc:AlternateContent xmlns:mc="http://schemas.openxmlformats.org/markup-compatibility/2006" xmlns:a14="http://schemas.microsoft.com/office/drawing/2010/main">
-        <mc:Choice Requires="a14">
+      <mc:AlternateContent xmlns:mc="http://schemas.openxmlformats.org/markup-compatibility/2006">
+        <mc:Choice xmlns:a14="http://schemas.microsoft.com/office/drawing/2010/main" Requires="a14">
           <p:sp>
             <p:nvSpPr>
               <p:cNvPr id="19" name="TextBox 18"/>
@@ -27418,8 +27424,8 @@
             </p:nvSpPr>
             <p:spPr>
               <a:xfrm>
-                <a:off x="8234980" y="2631233"/>
-                <a:ext cx="3209730" cy="1323439"/>
+                <a:off x="7887844" y="2529632"/>
+                <a:ext cx="3957020" cy="1446550"/>
               </a:xfrm>
               <a:prstGeom prst="rect">
                 <a:avLst/>
@@ -27439,7 +27445,7 @@
                   <a:t>        </a:t>
                 </a:r>
                 <a:r>
-                  <a:rPr lang="en-US" altLang="ko-KR" sz="2000" dirty="0">
+                  <a:rPr lang="en-US" altLang="ko-KR" sz="2400" dirty="0">
                     <a:latin typeface="Times New Roman" panose="02020603050405020304" pitchFamily="18" charset="0"/>
                     <a:cs typeface="Times New Roman" panose="02020603050405020304" pitchFamily="18" charset="0"/>
                   </a:rPr>
@@ -27450,14 +27456,14 @@
                     <m:sSub>
                       <m:sSubPr>
                         <m:ctrlPr>
-                          <a:rPr lang="en-US" altLang="ko-KR" sz="2000" i="1">
+                          <a:rPr lang="en-US" altLang="ko-KR" sz="2400" i="1">
                             <a:latin typeface="Cambria Math" panose="02040503050406030204" pitchFamily="18" charset="0"/>
                           </a:rPr>
                         </m:ctrlPr>
                       </m:sSubPr>
                       <m:e>
                         <m:r>
-                          <a:rPr lang="en-US" altLang="ko-KR" sz="2000" b="0" i="1" smtClean="0">
+                          <a:rPr lang="en-US" altLang="ko-KR" sz="2400" b="0" i="1" smtClean="0">
                             <a:latin typeface="Cambria Math" panose="02040503050406030204" pitchFamily="18" charset="0"/>
                           </a:rPr>
                           <m:t>𝑤</m:t>
@@ -27465,7 +27471,7 @@
                       </m:e>
                       <m:sub>
                         <m:r>
-                          <a:rPr lang="en-US" altLang="ko-KR" sz="2000" i="1">
+                          <a:rPr lang="en-US" altLang="ko-KR" sz="2400" i="1">
                             <a:latin typeface="Cambria Math" panose="02040503050406030204" pitchFamily="18" charset="0"/>
                           </a:rPr>
                           <m:t>1</m:t>
@@ -27475,14 +27481,14 @@
                     <m:sSub>
                       <m:sSubPr>
                         <m:ctrlPr>
-                          <a:rPr lang="en-US" altLang="ko-KR" sz="2000" i="1">
+                          <a:rPr lang="en-US" altLang="ko-KR" sz="2400" i="1">
                             <a:latin typeface="Cambria Math" panose="02040503050406030204" pitchFamily="18" charset="0"/>
                           </a:rPr>
                         </m:ctrlPr>
                       </m:sSubPr>
                       <m:e>
                         <m:r>
-                          <a:rPr lang="en-US" altLang="ko-KR" sz="2000" i="1">
+                          <a:rPr lang="en-US" altLang="ko-KR" sz="2400" i="1">
                             <a:latin typeface="Cambria Math" panose="02040503050406030204" pitchFamily="18" charset="0"/>
                           </a:rPr>
                           <m:t>𝑥</m:t>
@@ -27490,7 +27496,7 @@
                       </m:e>
                       <m:sub>
                         <m:r>
-                          <a:rPr lang="en-US" altLang="ko-KR" sz="2000" i="1">
+                          <a:rPr lang="en-US" altLang="ko-KR" sz="2400" i="1">
                             <a:latin typeface="Cambria Math" panose="02040503050406030204" pitchFamily="18" charset="0"/>
                           </a:rPr>
                           <m:t>1</m:t>
@@ -27500,7 +27506,7 @@
                   </m:oMath>
                 </a14:m>
                 <a:r>
-                  <a:rPr lang="en-US" altLang="ko-KR" sz="2000" dirty="0">
+                  <a:rPr lang="en-US" altLang="ko-KR" sz="2400" dirty="0">
                     <a:latin typeface="Times New Roman" panose="02020603050405020304" pitchFamily="18" charset="0"/>
                     <a:cs typeface="Times New Roman" panose="02020603050405020304" pitchFamily="18" charset="0"/>
                   </a:rPr>
@@ -27511,14 +27517,14 @@
                     <m:sSub>
                       <m:sSubPr>
                         <m:ctrlPr>
-                          <a:rPr lang="en-US" altLang="ko-KR" sz="2000" i="1" smtClean="0">
+                          <a:rPr lang="en-US" altLang="ko-KR" sz="2400" i="1" smtClean="0">
                             <a:latin typeface="Cambria Math" panose="02040503050406030204" pitchFamily="18" charset="0"/>
                           </a:rPr>
                         </m:ctrlPr>
                       </m:sSubPr>
                       <m:e>
                         <m:r>
-                          <a:rPr lang="en-US" altLang="ko-KR" sz="2000" b="0" i="1" smtClean="0">
+                          <a:rPr lang="en-US" altLang="ko-KR" sz="2400" b="0" i="1" smtClean="0">
                             <a:latin typeface="Cambria Math" panose="02040503050406030204" pitchFamily="18" charset="0"/>
                           </a:rPr>
                           <m:t>𝑤</m:t>
@@ -27526,7 +27532,7 @@
                       </m:e>
                       <m:sub>
                         <m:r>
-                          <a:rPr lang="en-US" altLang="ko-KR" sz="2000" b="0" i="1" smtClean="0">
+                          <a:rPr lang="en-US" altLang="ko-KR" sz="2400" b="0" i="1" smtClean="0">
                             <a:latin typeface="Cambria Math" panose="02040503050406030204" pitchFamily="18" charset="0"/>
                           </a:rPr>
                           <m:t>2</m:t>
@@ -27536,7 +27542,7 @@
                   </m:oMath>
                 </a14:m>
                 <a:r>
-                  <a:rPr lang="en-US" altLang="ko-KR" sz="2000" dirty="0">
+                  <a:rPr lang="en-US" altLang="ko-KR" sz="2400" dirty="0">
                     <a:latin typeface="Times New Roman" panose="02020603050405020304" pitchFamily="18" charset="0"/>
                     <a:cs typeface="Times New Roman" panose="02020603050405020304" pitchFamily="18" charset="0"/>
                   </a:rPr>
@@ -27547,14 +27553,14 @@
                     <m:sSub>
                       <m:sSubPr>
                         <m:ctrlPr>
-                          <a:rPr lang="en-US" altLang="ko-KR" sz="2000" i="1">
+                          <a:rPr lang="en-US" altLang="ko-KR" sz="2400" i="1">
                             <a:latin typeface="Cambria Math" panose="02040503050406030204" pitchFamily="18" charset="0"/>
                           </a:rPr>
                         </m:ctrlPr>
                       </m:sSubPr>
                       <m:e>
                         <m:r>
-                          <a:rPr lang="en-US" altLang="ko-KR" sz="2000" i="1">
+                          <a:rPr lang="en-US" altLang="ko-KR" sz="2400" i="1">
                             <a:latin typeface="Cambria Math" panose="02040503050406030204" pitchFamily="18" charset="0"/>
                           </a:rPr>
                           <m:t>𝑥</m:t>
@@ -27562,7 +27568,7 @@
                       </m:e>
                       <m:sub>
                         <m:r>
-                          <a:rPr lang="en-US" altLang="ko-KR" sz="2000" b="0" i="1" smtClean="0">
+                          <a:rPr lang="en-US" altLang="ko-KR" sz="2400" b="0" i="1" smtClean="0">
                             <a:latin typeface="Cambria Math" panose="02040503050406030204" pitchFamily="18" charset="0"/>
                           </a:rPr>
                           <m:t>2</m:t>
@@ -27572,21 +27578,21 @@
                   </m:oMath>
                 </a14:m>
                 <a:r>
-                  <a:rPr lang="en-US" altLang="ko-KR" sz="2000" dirty="0">
+                  <a:rPr lang="en-US" altLang="ko-KR" sz="2400" dirty="0">
                     <a:latin typeface="Times New Roman" panose="02020603050405020304" pitchFamily="18" charset="0"/>
                     <a:cs typeface="Times New Roman" panose="02020603050405020304" pitchFamily="18" charset="0"/>
                   </a:rPr>
                   <a:t> ≤ </a:t>
                 </a:r>
                 <a:r>
-                  <a:rPr lang="en-US" altLang="ko-KR" sz="2000" i="1" dirty="0">
+                  <a:rPr lang="en-US" altLang="ko-KR" sz="2400" i="1" dirty="0">
                     <a:latin typeface="Times New Roman" panose="02020603050405020304" pitchFamily="18" charset="0"/>
                     <a:cs typeface="Times New Roman" panose="02020603050405020304" pitchFamily="18" charset="0"/>
                   </a:rPr>
                   <a:t>Ꝋ</a:t>
                 </a:r>
                 <a:r>
-                  <a:rPr lang="en-US" altLang="ko-KR" sz="2000" dirty="0">
+                  <a:rPr lang="en-US" altLang="ko-KR" sz="2400" dirty="0">
                     <a:latin typeface="Times New Roman" panose="02020603050405020304" pitchFamily="18" charset="0"/>
                     <a:cs typeface="Times New Roman" panose="02020603050405020304" pitchFamily="18" charset="0"/>
                   </a:rPr>
@@ -27608,21 +27614,28 @@
                     <a:latin typeface="Times New Roman" panose="02020603050405020304" pitchFamily="18" charset="0"/>
                     <a:cs typeface="Times New Roman" panose="02020603050405020304" pitchFamily="18" charset="0"/>
                   </a:rPr>
-                  <a:t>          1  (</a:t>
+                  <a:t>          </a:t>
+                </a:r>
+                <a:r>
+                  <a:rPr lang="en-US" altLang="ko-KR" sz="2400" dirty="0">
+                    <a:latin typeface="Times New Roman" panose="02020603050405020304" pitchFamily="18" charset="0"/>
+                    <a:cs typeface="Times New Roman" panose="02020603050405020304" pitchFamily="18" charset="0"/>
+                  </a:rPr>
+                  <a:t>1  (</a:t>
                 </a:r>
                 <a14:m>
                   <m:oMath xmlns:m="http://schemas.openxmlformats.org/officeDocument/2006/math">
                     <m:sSub>
                       <m:sSubPr>
                         <m:ctrlPr>
-                          <a:rPr lang="en-US" altLang="ko-KR" sz="2000" i="1">
+                          <a:rPr lang="en-US" altLang="ko-KR" sz="2400" i="1">
                             <a:latin typeface="Cambria Math" panose="02040503050406030204" pitchFamily="18" charset="0"/>
                           </a:rPr>
                         </m:ctrlPr>
                       </m:sSubPr>
                       <m:e>
                         <m:r>
-                          <a:rPr lang="en-US" altLang="ko-KR" sz="2000" i="1">
+                          <a:rPr lang="en-US" altLang="ko-KR" sz="2400" i="1">
                             <a:latin typeface="Cambria Math" panose="02040503050406030204" pitchFamily="18" charset="0"/>
                           </a:rPr>
                           <m:t>𝑤</m:t>
@@ -27630,7 +27643,7 @@
                       </m:e>
                       <m:sub>
                         <m:r>
-                          <a:rPr lang="en-US" altLang="ko-KR" sz="2000" i="1">
+                          <a:rPr lang="en-US" altLang="ko-KR" sz="2400" i="1">
                             <a:latin typeface="Cambria Math" panose="02040503050406030204" pitchFamily="18" charset="0"/>
                           </a:rPr>
                           <m:t>1</m:t>
@@ -27640,14 +27653,14 @@
                     <m:sSub>
                       <m:sSubPr>
                         <m:ctrlPr>
-                          <a:rPr lang="en-US" altLang="ko-KR" sz="2000" i="1">
+                          <a:rPr lang="en-US" altLang="ko-KR" sz="2400" i="1">
                             <a:latin typeface="Cambria Math" panose="02040503050406030204" pitchFamily="18" charset="0"/>
                           </a:rPr>
                         </m:ctrlPr>
                       </m:sSubPr>
                       <m:e>
                         <m:r>
-                          <a:rPr lang="en-US" altLang="ko-KR" sz="2000" i="1">
+                          <a:rPr lang="en-US" altLang="ko-KR" sz="2400" i="1">
                             <a:latin typeface="Cambria Math" panose="02040503050406030204" pitchFamily="18" charset="0"/>
                           </a:rPr>
                           <m:t>𝑥</m:t>
@@ -27655,7 +27668,7 @@
                       </m:e>
                       <m:sub>
                         <m:r>
-                          <a:rPr lang="en-US" altLang="ko-KR" sz="2000" i="1">
+                          <a:rPr lang="en-US" altLang="ko-KR" sz="2400" i="1">
                             <a:latin typeface="Cambria Math" panose="02040503050406030204" pitchFamily="18" charset="0"/>
                           </a:rPr>
                           <m:t>1</m:t>
@@ -27665,7 +27678,7 @@
                   </m:oMath>
                 </a14:m>
                 <a:r>
-                  <a:rPr lang="en-US" altLang="ko-KR" sz="2000" dirty="0">
+                  <a:rPr lang="en-US" altLang="ko-KR" sz="2400" dirty="0">
                     <a:latin typeface="Times New Roman" panose="02020603050405020304" pitchFamily="18" charset="0"/>
                     <a:cs typeface="Times New Roman" panose="02020603050405020304" pitchFamily="18" charset="0"/>
                   </a:rPr>
@@ -27676,14 +27689,14 @@
                     <m:sSub>
                       <m:sSubPr>
                         <m:ctrlPr>
-                          <a:rPr lang="en-US" altLang="ko-KR" sz="2000" i="1">
+                          <a:rPr lang="en-US" altLang="ko-KR" sz="2400" i="1">
                             <a:latin typeface="Cambria Math" panose="02040503050406030204" pitchFamily="18" charset="0"/>
                           </a:rPr>
                         </m:ctrlPr>
                       </m:sSubPr>
                       <m:e>
                         <m:r>
-                          <a:rPr lang="en-US" altLang="ko-KR" sz="2000" i="1">
+                          <a:rPr lang="en-US" altLang="ko-KR" sz="2400" i="1">
                             <a:latin typeface="Cambria Math" panose="02040503050406030204" pitchFamily="18" charset="0"/>
                           </a:rPr>
                           <m:t>𝑤</m:t>
@@ -27691,7 +27704,7 @@
                       </m:e>
                       <m:sub>
                         <m:r>
-                          <a:rPr lang="en-US" altLang="ko-KR" sz="2000" i="1">
+                          <a:rPr lang="en-US" altLang="ko-KR" sz="2400" i="1">
                             <a:latin typeface="Cambria Math" panose="02040503050406030204" pitchFamily="18" charset="0"/>
                           </a:rPr>
                           <m:t>2</m:t>
@@ -27701,7 +27714,7 @@
                   </m:oMath>
                 </a14:m>
                 <a:r>
-                  <a:rPr lang="en-US" altLang="ko-KR" sz="2000" dirty="0">
+                  <a:rPr lang="en-US" altLang="ko-KR" sz="2400" dirty="0">
                     <a:latin typeface="Times New Roman" panose="02020603050405020304" pitchFamily="18" charset="0"/>
                     <a:cs typeface="Times New Roman" panose="02020603050405020304" pitchFamily="18" charset="0"/>
                   </a:rPr>
@@ -27712,14 +27725,14 @@
                     <m:sSub>
                       <m:sSubPr>
                         <m:ctrlPr>
-                          <a:rPr lang="en-US" altLang="ko-KR" sz="2000" i="1">
+                          <a:rPr lang="en-US" altLang="ko-KR" sz="2400" i="1">
                             <a:latin typeface="Cambria Math" panose="02040503050406030204" pitchFamily="18" charset="0"/>
                           </a:rPr>
                         </m:ctrlPr>
                       </m:sSubPr>
                       <m:e>
                         <m:r>
-                          <a:rPr lang="en-US" altLang="ko-KR" sz="2000" i="1">
+                          <a:rPr lang="en-US" altLang="ko-KR" sz="2400" i="1">
                             <a:latin typeface="Cambria Math" panose="02040503050406030204" pitchFamily="18" charset="0"/>
                           </a:rPr>
                           <m:t>𝑥</m:t>
@@ -27727,7 +27740,7 @@
                       </m:e>
                       <m:sub>
                         <m:r>
-                          <a:rPr lang="en-US" altLang="ko-KR" sz="2000" i="1">
+                          <a:rPr lang="en-US" altLang="ko-KR" sz="2400" i="1">
                             <a:latin typeface="Cambria Math" panose="02040503050406030204" pitchFamily="18" charset="0"/>
                           </a:rPr>
                           <m:t>2</m:t>
@@ -27737,27 +27750,27 @@
                   </m:oMath>
                 </a14:m>
                 <a:r>
-                  <a:rPr lang="en-US" altLang="ko-KR" sz="2000" dirty="0">
+                  <a:rPr lang="en-US" altLang="ko-KR" sz="2400" dirty="0">
                     <a:latin typeface="Times New Roman" panose="02020603050405020304" pitchFamily="18" charset="0"/>
                     <a:cs typeface="Times New Roman" panose="02020603050405020304" pitchFamily="18" charset="0"/>
                   </a:rPr>
                   <a:t> &gt; </a:t>
                 </a:r>
                 <a:r>
-                  <a:rPr lang="en-US" altLang="ko-KR" sz="2000" i="1" dirty="0">
+                  <a:rPr lang="en-US" altLang="ko-KR" sz="2400" i="1" dirty="0">
                     <a:latin typeface="Times New Roman" panose="02020603050405020304" pitchFamily="18" charset="0"/>
                     <a:cs typeface="Times New Roman" panose="02020603050405020304" pitchFamily="18" charset="0"/>
                   </a:rPr>
                   <a:t>Ꝋ</a:t>
                 </a:r>
                 <a:r>
-                  <a:rPr lang="en-US" altLang="ko-KR" sz="2000" dirty="0">
+                  <a:rPr lang="en-US" altLang="ko-KR" sz="2400" dirty="0">
                     <a:latin typeface="Times New Roman" panose="02020603050405020304" pitchFamily="18" charset="0"/>
                     <a:cs typeface="Times New Roman" panose="02020603050405020304" pitchFamily="18" charset="0"/>
                   </a:rPr>
                   <a:t> )</a:t>
                 </a:r>
-                <a:endParaRPr lang="ko-KR" altLang="en-US" sz="2000" dirty="0">
+                <a:endParaRPr lang="ko-KR" altLang="en-US" sz="2400" dirty="0">
                   <a:latin typeface="Times New Roman" panose="02020603050405020304" pitchFamily="18" charset="0"/>
                   <a:cs typeface="Times New Roman" panose="02020603050405020304" pitchFamily="18" charset="0"/>
                 </a:endParaRPr>
@@ -27777,7 +27790,7 @@
             </p:txBody>
           </p:sp>
         </mc:Choice>
-        <mc:Fallback xmlns="">
+        <mc:Fallback>
           <p:sp>
             <p:nvSpPr>
               <p:cNvPr id="19" name="TextBox 18"/>
@@ -27788,16 +27801,16 @@
             </p:nvSpPr>
             <p:spPr>
               <a:xfrm>
-                <a:off x="8234980" y="2631233"/>
-                <a:ext cx="3209730" cy="1323439"/>
+                <a:off x="7887844" y="2529632"/>
+                <a:ext cx="3957020" cy="1446550"/>
               </a:xfrm>
               <a:prstGeom prst="rect">
                 <a:avLst/>
               </a:prstGeom>
-              <a:blipFill rotWithShape="0">
+              <a:blipFill>
                 <a:blip r:embed="rId4"/>
                 <a:stretch>
-                  <a:fillRect t="-3226" r="-1141"/>
+                  <a:fillRect t="-3797"/>
                 </a:stretch>
               </a:blipFill>
             </p:spPr>
@@ -27824,7 +27837,7 @@
         </p:nvSpPr>
         <p:spPr>
           <a:xfrm>
-            <a:off x="8668056" y="2785818"/>
+            <a:off x="8320920" y="2684217"/>
             <a:ext cx="252431" cy="738063"/>
           </a:xfrm>
           <a:prstGeom prst="leftBrace">
@@ -28213,8 +28226,8 @@
           </p:sp>
         </mc:Fallback>
       </mc:AlternateContent>
-      <mc:AlternateContent xmlns:mc="http://schemas.openxmlformats.org/markup-compatibility/2006" xmlns:a14="http://schemas.microsoft.com/office/drawing/2010/main">
-        <mc:Choice Requires="a14">
+      <mc:AlternateContent xmlns:mc="http://schemas.openxmlformats.org/markup-compatibility/2006">
+        <mc:Choice xmlns:a14="http://schemas.microsoft.com/office/drawing/2010/main" Requires="a14">
           <p:sp>
             <p:nvSpPr>
               <p:cNvPr id="28" name="TextBox 27"/>
@@ -28223,7 +28236,7 @@
             </p:nvSpPr>
             <p:spPr>
               <a:xfrm>
-                <a:off x="7975696" y="2837404"/>
+                <a:off x="7628560" y="2735803"/>
                 <a:ext cx="501123" cy="553998"/>
               </a:xfrm>
               <a:prstGeom prst="rect">
@@ -28258,7 +28271,7 @@
             </p:txBody>
           </p:sp>
         </mc:Choice>
-        <mc:Fallback xmlns="">
+        <mc:Fallback>
           <p:sp>
             <p:nvSpPr>
               <p:cNvPr id="28" name="TextBox 27"/>
@@ -28269,13 +28282,13 @@
             </p:nvSpPr>
             <p:spPr>
               <a:xfrm>
-                <a:off x="7975696" y="2837404"/>
+                <a:off x="7628560" y="2735803"/>
                 <a:ext cx="501123" cy="553998"/>
               </a:xfrm>
               <a:prstGeom prst="rect">
                 <a:avLst/>
               </a:prstGeom>
-              <a:blipFill rotWithShape="0">
+              <a:blipFill>
                 <a:blip r:embed="rId8"/>
                 <a:stretch>
                   <a:fillRect/>

</xml_diff>